<commit_message>
Read through start of results.
</commit_message>
<xml_diff>
--- a/Figures/Powerpoints/Antibody clones.pptx
+++ b/Figures/Powerpoints/Antibody clones.pptx
@@ -3923,7 +3923,7 @@
           <p:nvPr>
             <p:extLst>
               <p:ext uri="{D42A27DB-BD31-4B8C-83A1-F6EECF244321}">
-                <p14:modId xmlns:p14="http://schemas.microsoft.com/office/powerpoint/2010/main" val="4104933140"/>
+                <p14:modId xmlns:p14="http://schemas.microsoft.com/office/powerpoint/2010/main" val="621963729"/>
               </p:ext>
             </p:extLst>
           </p:nvPr>
@@ -4360,16 +4360,24 @@
                     <a:bodyPr/>
                     <a:lstStyle/>
                     <a:p>
-                      <a:endParaRPr lang="en-GB" dirty="0"/>
-                    </a:p>
-                  </a:txBody>
-                  <a:tcPr/>
-                </a:tc>
-                <a:tc>
-                  <a:txBody>
-                    <a:bodyPr/>
-                    <a:lstStyle/>
-                    <a:p>
+                      <a:r>
+                        <a:rPr lang="en-GB" dirty="0" smtClean="0"/>
+                        <a:t>A2F10</a:t>
+                      </a:r>
+                      <a:endParaRPr lang="en-GB" dirty="0"/>
+                    </a:p>
+                  </a:txBody>
+                  <a:tcPr/>
+                </a:tc>
+                <a:tc>
+                  <a:txBody>
+                    <a:bodyPr/>
+                    <a:lstStyle/>
+                    <a:p>
+                      <a:r>
+                        <a:rPr lang="en-GB" dirty="0" err="1" smtClean="0"/>
+                        <a:t>eBioscience</a:t>
+                      </a:r>
                       <a:endParaRPr lang="en-GB" dirty="0"/>
                     </a:p>
                   </a:txBody>
@@ -4756,6 +4764,10 @@
                     <a:bodyPr/>
                     <a:lstStyle/>
                     <a:p>
+                      <a:r>
+                        <a:rPr lang="en-GB" dirty="0" smtClean="0"/>
+                        <a:t>-</a:t>
+                      </a:r>
                       <a:endParaRPr lang="en-GB" dirty="0"/>
                     </a:p>
                   </a:txBody>

</xml_diff>